<commit_message>
Creacion del Modulo Completo de IronMan
</commit_message>
<xml_diff>
--- a/Presentaciones/05. Fundamentos del desarrollo de aplicaciones Web.pptx
+++ b/Presentaciones/05. Fundamentos del desarrollo de aplicaciones Web.pptx
@@ -152,7 +152,7 @@
   </p:defaultTextStyle>
   <p:extLst>
     <p:ext uri="{EFAFB233-063F-42B5-8137-9DF3F51BA10A}">
-      <p15:sldGuideLst xmlns:p15="http://schemas.microsoft.com/office/powerpoint/2012/main">
+      <p15:sldGuideLst xmlns:p15="http://schemas.microsoft.com/office/powerpoint/2012/main" xmlns="">
         <p15:guide id="1" orient="horz" pos="2160">
           <p15:clr>
             <a:srgbClr val="A4A3A4"/>
@@ -166,7 +166,7 @@
       </p15:sldGuideLst>
     </p:ext>
     <p:ext uri="{2D200454-40CA-4A62-9FC3-DE9A4176ACB9}">
-      <p15:notesGuideLst xmlns:p15="http://schemas.microsoft.com/office/powerpoint/2012/main">
+      <p15:notesGuideLst xmlns:p15="http://schemas.microsoft.com/office/powerpoint/2012/main" xmlns="">
         <p15:guide id="1" orient="horz" pos="2880">
           <p15:clr>
             <a:srgbClr val="A4A3A4"/>
@@ -266,7 +266,7 @@
             <a:fld id="{9EDD97AB-8915-4450-BB4D-ADC3317B43DD}" type="datetimeFigureOut">
               <a:rPr lang="es-AR" smtClean="0"/>
               <a:pPr/>
-              <a:t>15/05/2014</a:t>
+              <a:t>29/04/2015</a:t>
             </a:fld>
             <a:endParaRPr lang="es-AR"/>
           </a:p>
@@ -433,7 +433,7 @@
             <a:fld id="{747A4859-E260-4AFA-8974-05D8619D18C8}" type="datetimeFigureOut">
               <a:rPr lang="es-AR" smtClean="0"/>
               <a:pPr/>
-              <a:t>15/05/2014</a:t>
+              <a:t>29/04/2015</a:t>
             </a:fld>
             <a:endParaRPr lang="es-AR"/>
           </a:p>
@@ -5153,7 +5153,7 @@
           <a:p>
             <a:fld id="{D4E948B8-39DF-443C-9C0E-DE7776715A83}" type="datetime1">
               <a:rPr lang="es-ES" smtClean="0"/>
-              <a:t>15/05/2014</a:t>
+              <a:t>29/04/2015</a:t>
             </a:fld>
             <a:endParaRPr lang="es-ES"/>
           </a:p>
@@ -5305,7 +5305,7 @@
           <a:p>
             <a:fld id="{131AE45D-80D2-4218-BC2A-1E410CE94BFB}" type="datetime1">
               <a:rPr lang="es-ES" smtClean="0"/>
-              <a:t>15/05/2014</a:t>
+              <a:t>29/04/2015</a:t>
             </a:fld>
             <a:endParaRPr lang="es-ES"/>
           </a:p>
@@ -7185,7 +7185,7 @@
           <a:p>
             <a:fld id="{85F2885C-2083-40B5-AB49-5452F889C70B}" type="datetime1">
               <a:rPr lang="es-ES" smtClean="0"/>
-              <a:t>15/05/2014</a:t>
+              <a:t>29/04/2015</a:t>
             </a:fld>
             <a:endParaRPr lang="es-ES"/>
           </a:p>
@@ -7308,7 +7308,7 @@
           <a:p>
             <a:fld id="{2801A7D3-9768-4A32-80EC-543A72A31904}" type="datetime1">
               <a:rPr lang="es-ES" smtClean="0"/>
-              <a:t>15/05/2014</a:t>
+              <a:t>29/04/2015</a:t>
             </a:fld>
             <a:endParaRPr lang="es-ES"/>
           </a:p>
@@ -9204,7 +9204,7 @@
           <a:p>
             <a:fld id="{14B1FDE5-9B68-486C-9C4E-969B3E792135}" type="datetime1">
               <a:rPr lang="es-ES" smtClean="0"/>
-              <a:t>15/05/2014</a:t>
+              <a:t>29/04/2015</a:t>
             </a:fld>
             <a:endParaRPr lang="es-ES"/>
           </a:p>
@@ -9861,7 +9861,7 @@
           <a:p>
             <a:fld id="{8FCBE040-AE73-4554-A161-6248311C3B11}" type="datetime1">
               <a:rPr lang="es-ES" smtClean="0"/>
-              <a:t>15/05/2014</a:t>
+              <a:t>29/04/2015</a:t>
             </a:fld>
             <a:endParaRPr lang="es-AR"/>
           </a:p>
@@ -10416,7 +10416,7 @@
           <a:p>
             <a:fld id="{63499BB1-1F0D-4956-8750-B702BE9F658E}" type="datetime1">
               <a:rPr lang="es-ES" smtClean="0"/>
-              <a:t>15/05/2014</a:t>
+              <a:t>29/04/2015</a:t>
             </a:fld>
             <a:endParaRPr lang="es-AR"/>
           </a:p>
@@ -10823,7 +10823,7 @@
           <a:p>
             <a:fld id="{6CA2A9DD-AD09-4BEB-90DD-0171E6B47F24}" type="datetime1">
               <a:rPr lang="es-ES" smtClean="0"/>
-              <a:t>15/05/2014</a:t>
+              <a:t>29/04/2015</a:t>
             </a:fld>
             <a:endParaRPr lang="es-ES"/>
           </a:p>
@@ -11030,7 +11030,7 @@
           <a:p>
             <a:fld id="{1B662822-C013-4226-B93C-8E303BB13105}" type="datetime1">
               <a:rPr lang="es-ES" smtClean="0"/>
-              <a:t>15/05/2014</a:t>
+              <a:t>29/04/2015</a:t>
             </a:fld>
             <a:endParaRPr lang="es-AR"/>
           </a:p>
@@ -11073,12 +11073,12 @@
         <p:spPr>
           <a:xfrm>
             <a:off x="467544" y="1700808"/>
-            <a:ext cx="7462042" cy="4752528"/>
+            <a:ext cx="7992888" cy="4752528"/>
           </a:xfrm>
         </p:spPr>
         <p:txBody>
           <a:bodyPr>
-            <a:normAutofit fontScale="85000" lnSpcReduction="10000"/>
+            <a:normAutofit fontScale="92500" lnSpcReduction="20000"/>
           </a:bodyPr>
           <a:lstStyle/>
           <a:p>
@@ -11108,12 +11108,8 @@
               <a:t>un </a:t>
             </a:r>
             <a:r>
-              <a:rPr lang="es-AR" sz="2000" dirty="0" err="1" smtClean="0"/>
-              <a:t>evanto</a:t>
-            </a:r>
-            <a:r>
               <a:rPr lang="es-AR" sz="2000" dirty="0" smtClean="0"/>
-              <a:t> </a:t>
+              <a:t>evento </a:t>
             </a:r>
             <a:r>
               <a:rPr lang="es-AR" sz="2000" dirty="0"/>
@@ -11426,7 +11422,7 @@
           <a:p>
             <a:fld id="{B755FCC6-6494-4831-A7C9-76B1E933CEB5}" type="datetime1">
               <a:rPr lang="es-ES" smtClean="0"/>
-              <a:t>15/05/2014</a:t>
+              <a:t>29/04/2015</a:t>
             </a:fld>
             <a:endParaRPr lang="es-AR"/>
           </a:p>
@@ -11904,7 +11900,7 @@
           <a:p>
             <a:fld id="{7EAF8A36-12F8-4A9D-AC98-B9F061147416}" type="datetime1">
               <a:rPr lang="es-ES" smtClean="0"/>
-              <a:t>15/05/2014</a:t>
+              <a:t>29/04/2015</a:t>
             </a:fld>
             <a:endParaRPr lang="es-ES"/>
           </a:p>
@@ -12098,7 +12094,7 @@
           <a:p>
             <a:fld id="{B2416FF3-57B8-4030-9E9A-1F36F1489173}" type="datetime1">
               <a:rPr lang="es-ES" smtClean="0"/>
-              <a:t>15/05/2014</a:t>
+              <a:t>29/04/2015</a:t>
             </a:fld>
             <a:endParaRPr lang="es-ES"/>
           </a:p>
@@ -12274,7 +12270,7 @@
           <a:p>
             <a:fld id="{C9C3B411-E38A-4FAD-88EA-4ADFA77201AE}" type="datetime1">
               <a:rPr lang="es-ES" smtClean="0"/>
-              <a:t>15/05/2014</a:t>
+              <a:t>29/04/2015</a:t>
             </a:fld>
             <a:endParaRPr lang="es-AR"/>
           </a:p>
@@ -12811,11 +12807,7 @@
           <a:p>
             <a:r>
               <a:rPr lang="es-ES_tradnl" dirty="0" smtClean="0"/>
-              <a:t>Eventos </a:t>
-            </a:r>
-            <a:r>
-              <a:rPr lang="es-ES_tradnl" dirty="0" smtClean="0"/>
-              <a:t>en las App Web</a:t>
+              <a:t>Eventos en las App Web</a:t>
             </a:r>
             <a:endParaRPr lang="es-AR" dirty="0"/>
           </a:p>
@@ -12843,7 +12835,7 @@
           <a:p>
             <a:fld id="{1DE26F06-2737-4AF7-8610-EE26A64AA6F2}" type="datetime1">
               <a:rPr lang="es-ES" smtClean="0"/>
-              <a:t>15/05/2014</a:t>
+              <a:t>29/04/2015</a:t>
             </a:fld>
             <a:endParaRPr lang="es-ES"/>
           </a:p>
@@ -12940,12 +12932,12 @@
               <a:t>Eventos a nivel de </a:t>
             </a:r>
             <a:r>
-              <a:rPr lang="es-ES_tradnl" dirty="0" err="1" smtClean="0"/>
-              <a:t>Pagina.de</a:t>
-            </a:r>
-            <a:r>
               <a:rPr lang="es-ES_tradnl" dirty="0" smtClean="0"/>
-              <a:t> los Normalmente realizados por el usuario, como el </a:t>
+              <a:t>Pagina de </a:t>
+            </a:r>
+            <a:r>
+              <a:rPr lang="es-ES_tradnl" dirty="0" smtClean="0"/>
+              <a:t>los Normalmente realizados por el usuario, como el </a:t>
             </a:r>
             <a:r>
               <a:rPr lang="es-ES_tradnl" dirty="0" err="1" smtClean="0"/>
@@ -13046,7 +13038,7 @@
           <a:p>
             <a:fld id="{6D10AC78-B0D0-4373-9075-7278B1EF7F5F}" type="datetime1">
               <a:rPr lang="es-ES" smtClean="0"/>
-              <a:t>15/05/2014</a:t>
+              <a:t>29/04/2015</a:t>
             </a:fld>
             <a:endParaRPr lang="es-AR"/>
           </a:p>
@@ -13533,7 +13525,7 @@
           <a:p>
             <a:fld id="{B0E3150E-1C7B-4338-ACB2-D685165AB3BC}" type="datetime1">
               <a:rPr lang="es-ES" smtClean="0"/>
-              <a:t>15/05/2014</a:t>
+              <a:t>29/04/2015</a:t>
             </a:fld>
             <a:endParaRPr lang="es-AR"/>
           </a:p>
@@ -13617,8 +13609,8 @@
           </a:prstGeom>
           <a:noFill/>
           <a:extLst>
-            <a:ext uri="{909E8E84-426E-40dd-AFC4-6F175D3DCCD1}">
-              <a14:hiddenFill xmlns:a14="http://schemas.microsoft.com/office/drawing/2010/main" xmlns="">
+            <a:ext uri="{909E8E84-426E-40DD-AFC4-6F175D3DCCD1}">
+              <a14:hiddenFill xmlns:a14="http://schemas.microsoft.com/office/drawing/2010/main">
                 <a:solidFill>
                   <a:srgbClr val="FFFFFF"/>
                 </a:solidFill>
@@ -13730,7 +13722,7 @@
           <a:p>
             <a:fld id="{DDEE2451-7139-4161-9E88-FE1FCACA0835}" type="datetime1">
               <a:rPr lang="es-ES" smtClean="0"/>
-              <a:t>15/05/2014</a:t>
+              <a:t>29/04/2015</a:t>
             </a:fld>
             <a:endParaRPr lang="es-ES"/>
           </a:p>
@@ -13875,7 +13867,7 @@
           <a:p>
             <a:fld id="{55CE268A-6A55-4A56-A929-B2D4A8C9DC13}" type="datetime1">
               <a:rPr lang="es-ES" smtClean="0"/>
-              <a:t>15/05/2014</a:t>
+              <a:t>29/04/2015</a:t>
             </a:fld>
             <a:endParaRPr lang="es-AR"/>
           </a:p>
@@ -13956,18 +13948,7 @@
                   </a:schemeClr>
                 </a:solidFill>
               </a:rPr>
-              <a:t>Solicitud de </a:t>
-            </a:r>
-            <a:r>
-              <a:rPr lang="es-AR" sz="1800" b="1" dirty="0" smtClean="0">
-                <a:solidFill>
-                  <a:schemeClr val="tx2">
-                    <a:lumMod val="40000"/>
-                    <a:lumOff val="60000"/>
-                  </a:schemeClr>
-                </a:solidFill>
-              </a:rPr>
-              <a:t>página: </a:t>
+              <a:t>Solicitud de página: </a:t>
             </a:r>
           </a:p>
           <a:p>
@@ -13980,11 +13961,7 @@
             </a:pPr>
             <a:r>
               <a:rPr lang="es-AR" sz="1800" dirty="0" smtClean="0"/>
-              <a:t>se </a:t>
-            </a:r>
-            <a:r>
-              <a:rPr lang="es-AR" sz="1800" dirty="0" smtClean="0"/>
-              <a:t>produce antes de que comience el ciclo de vida de la página. Cuando un usuario solicita la página, ASP.NET determina si ésta se debe analizar y compilar (a fin de que comience el ciclo de vida de la página) o si se puede enviar una versión en caché de la página como respuesta sin ejecutar la página.</a:t>
+              <a:t>se produce antes de que comience el ciclo de vida de la página. Cuando un usuario solicita la página, ASP.NET determina si ésta se debe analizar y compilar (a fin de que comience el ciclo de vida de la página) o si se puede enviar una versión en caché de la página como respuesta sin ejecutar la página.</a:t>
             </a:r>
           </a:p>
           <a:p>
@@ -14027,11 +14004,7 @@
             </a:pPr>
             <a:r>
               <a:rPr lang="es-AR" sz="1800" dirty="0" smtClean="0"/>
-              <a:t>se </a:t>
-            </a:r>
-            <a:r>
-              <a:rPr lang="es-AR" sz="1800" dirty="0" smtClean="0"/>
-              <a:t>establecen las propiedades de la página, como </a:t>
+              <a:t>se establecen las propiedades de la página, como </a:t>
             </a:r>
             <a:r>
               <a:rPr lang="es-AR" sz="1800" dirty="0" err="1" smtClean="0"/>
@@ -14158,7 +14131,7 @@
           <a:p>
             <a:fld id="{C1283DE6-A026-4CB8-A656-71FDCD853F82}" type="datetime1">
               <a:rPr lang="es-ES" smtClean="0"/>
-              <a:t>15/05/2014</a:t>
+              <a:t>29/04/2015</a:t>
             </a:fld>
             <a:endParaRPr lang="es-AR"/>
           </a:p>
@@ -14220,18 +14193,7 @@
                   </a:schemeClr>
                 </a:solidFill>
               </a:rPr>
-              <a:t>Inicialización de </a:t>
-            </a:r>
-            <a:r>
-              <a:rPr lang="es-AR" sz="1600" b="1" dirty="0" smtClean="0">
-                <a:solidFill>
-                  <a:schemeClr val="tx2">
-                    <a:lumMod val="40000"/>
-                    <a:lumOff val="60000"/>
-                  </a:schemeClr>
-                </a:solidFill>
-              </a:rPr>
-              <a:t>página</a:t>
+              <a:t>Inicialización de página</a:t>
             </a:r>
             <a:r>
               <a:rPr lang="es-AR" sz="1600" dirty="0">
@@ -14257,11 +14219,7 @@
             <a:pPr lvl="1"/>
             <a:r>
               <a:rPr lang="es-AR" sz="1600" dirty="0" smtClean="0"/>
-              <a:t>los </a:t>
-            </a:r>
-            <a:r>
-              <a:rPr lang="es-AR" sz="1600" dirty="0" smtClean="0"/>
-              <a:t>controles incluidos en ella están disponibles y se establece la propiedad </a:t>
+              <a:t>los controles incluidos en ella están disponibles y se establece la propiedad </a:t>
             </a:r>
             <a:r>
               <a:rPr lang="es-AR" sz="1600" dirty="0" err="1" smtClean="0"/>
@@ -14306,11 +14264,7 @@
             </a:pPr>
             <a:r>
               <a:rPr lang="es-AR" sz="1600" dirty="0" smtClean="0"/>
-              <a:t>si </a:t>
-            </a:r>
-            <a:r>
-              <a:rPr lang="es-AR" sz="1600" dirty="0" smtClean="0"/>
-              <a:t>la solicitud actual es una devolución de datos, las propiedades del control se cargan con información recuperada del estado de vista y del estado del control.</a:t>
+              <a:t>si la solicitud actual es una devolución de datos, las propiedades del control se cargan con información recuperada del estado de vista y del estado del control.</a:t>
             </a:r>
           </a:p>
           <a:p>
@@ -14353,11 +14307,7 @@
             </a:pPr>
             <a:r>
               <a:rPr lang="es-AR" sz="1600" dirty="0" smtClean="0"/>
-              <a:t>durante </a:t>
-            </a:r>
-            <a:r>
-              <a:rPr lang="es-AR" sz="1600" dirty="0" smtClean="0"/>
-              <a:t>la validación, se llama al método </a:t>
+              <a:t>durante la validación, se llama al método </a:t>
             </a:r>
             <a:r>
               <a:rPr lang="es-AR" sz="1600" dirty="0" err="1" smtClean="0"/>
@@ -14494,7 +14444,7 @@
           <a:p>
             <a:fld id="{34522EFA-59C6-471C-AD86-079A3A5B57A2}" type="datetime1">
               <a:rPr lang="es-ES" smtClean="0"/>
-              <a:t>15/05/2014</a:t>
+              <a:t>29/04/2015</a:t>
             </a:fld>
             <a:endParaRPr lang="es-AR"/>
           </a:p>
@@ -14556,29 +14506,14 @@
                   </a:schemeClr>
                 </a:solidFill>
               </a:rPr>
-              <a:t>Control de eventos de devolución de </a:t>
-            </a:r>
-            <a:r>
-              <a:rPr lang="es-AR" sz="1600" b="1" dirty="0" smtClean="0">
-                <a:solidFill>
-                  <a:schemeClr val="tx2">
-                    <a:lumMod val="40000"/>
-                    <a:lumOff val="60000"/>
-                  </a:schemeClr>
-                </a:solidFill>
-              </a:rPr>
-              <a:t>datos:</a:t>
+              <a:t>Control de eventos de devolución de datos:</a:t>
             </a:r>
           </a:p>
           <a:p>
             <a:pPr lvl="1"/>
             <a:r>
               <a:rPr lang="es-AR" sz="1600" dirty="0" smtClean="0"/>
-              <a:t>si </a:t>
-            </a:r>
-            <a:r>
-              <a:rPr lang="es-AR" sz="1600" dirty="0" smtClean="0"/>
-              <a:t>la solicitud es una devolución de datos, se llama a los controladores de eventos.</a:t>
+              <a:t>si la solicitud es una devolución de datos, se llama a los controladores de eventos.</a:t>
             </a:r>
           </a:p>
           <a:p>
@@ -14615,11 +14550,7 @@
             </a:pPr>
             <a:r>
               <a:rPr lang="es-AR" sz="1600" dirty="0" smtClean="0"/>
-              <a:t>antes </a:t>
-            </a:r>
-            <a:r>
-              <a:rPr lang="es-AR" sz="1600" dirty="0" smtClean="0"/>
-              <a:t>de representar los datos, se guarda el estado de vista de la página y de todos los controles. Durante la fase de representación, la página llama al método </a:t>
+              <a:t>antes de representar los datos, se guarda el estado de vista de la página y de todos los controles. Durante la fase de representación, la página llama al método </a:t>
             </a:r>
             <a:r>
               <a:rPr lang="es-AR" sz="1600" dirty="0" err="1" smtClean="0"/>
@@ -14686,11 +14617,7 @@
             </a:pPr>
             <a:r>
               <a:rPr lang="es-AR" sz="1600" dirty="0" smtClean="0"/>
-              <a:t>se </a:t>
-            </a:r>
-            <a:r>
-              <a:rPr lang="es-AR" sz="1600" dirty="0" smtClean="0"/>
-              <a:t>llama a la descarga cuando la página se ha representado completamente, se ha enviado al cliente y está lista para ser descartada. Llegado este momento, se descargan las propiedades de la página, como </a:t>
+              <a:t>se llama a la descarga cuando la página se ha representado completamente, se ha enviado al cliente y está lista para ser descartada. Llegado este momento, se descargan las propiedades de la página, como </a:t>
             </a:r>
             <a:r>
               <a:rPr lang="es-AR" sz="1600" b="1" dirty="0" smtClean="0"/>
@@ -14817,7 +14744,7 @@
           <a:p>
             <a:fld id="{4C132BF1-D1FE-496F-B3E6-F6B57527534C}" type="datetime1">
               <a:rPr lang="es-ES" smtClean="0"/>
-              <a:t>15/05/2014</a:t>
+              <a:t>29/04/2015</a:t>
             </a:fld>
             <a:endParaRPr lang="es-AR"/>
           </a:p>
@@ -14893,11 +14820,7 @@
             <a:pPr lvl="1"/>
             <a:r>
               <a:rPr lang="es-AR" sz="1800" dirty="0" smtClean="0"/>
-              <a:t>usar </a:t>
-            </a:r>
-            <a:r>
-              <a:rPr lang="es-AR" sz="1800" dirty="0" smtClean="0"/>
-              <a:t>este evento para lo siguiente:</a:t>
+              <a:t>usar este evento para lo siguiente:</a:t>
             </a:r>
           </a:p>
           <a:p>
@@ -14996,11 +14919,7 @@
             </a:pPr>
             <a:r>
               <a:rPr lang="es-AR" sz="2000" dirty="0" smtClean="0"/>
-              <a:t>se </a:t>
-            </a:r>
-            <a:r>
-              <a:rPr lang="es-AR" sz="2000" dirty="0" smtClean="0"/>
-              <a:t>provoca cuanto todos los controles se han inicializado y se aplicado la configuración de máscara. Utilice este evento para leer o inicializar las propiedades del control.</a:t>
+              <a:t>se provoca cuanto todos los controles se han inicializado y se aplicado la configuración de máscara. Utilice este evento para leer o inicializar las propiedades del control.</a:t>
             </a:r>
           </a:p>
           <a:p>
@@ -15054,11 +14973,7 @@
             </a:pPr>
             <a:r>
               <a:rPr lang="es-AR" sz="2000" dirty="0" smtClean="0"/>
-              <a:t>lo </a:t>
-            </a:r>
-            <a:r>
-              <a:rPr lang="es-AR" sz="2000" dirty="0" smtClean="0"/>
-              <a:t>provoca el objeto Page. Utilice este evento para tareas de procesamiento que requieran que todo el proceso de inicialización haya finalizado.</a:t>
+              <a:t>lo provoca el objeto Page. Utilice este evento para tareas de procesamiento que requieran que todo el proceso de inicialización haya finalizado.</a:t>
             </a:r>
           </a:p>
           <a:p>
@@ -15179,7 +15094,7 @@
           <a:p>
             <a:fld id="{8E671650-0653-48A9-99EE-65DFA80B5D83}" type="datetime1">
               <a:rPr lang="es-ES" smtClean="0"/>
-              <a:t>15/05/2014</a:t>
+              <a:t>29/04/2015</a:t>
             </a:fld>
             <a:endParaRPr lang="es-AR"/>
           </a:p>
@@ -15257,11 +15172,7 @@
           <a:p>
             <a:r>
               <a:rPr lang="es-AR" sz="2000" dirty="0" smtClean="0"/>
-              <a:t>utilice </a:t>
-            </a:r>
-            <a:r>
-              <a:rPr lang="es-AR" sz="2000" dirty="0" smtClean="0"/>
-              <a:t>este evento si necesita realizar tareas de procesamiento en su página o control antes de que se provoque el evento Load. Después de que </a:t>
+              <a:t>utilice este evento si necesita realizar tareas de procesamiento en su página o control antes de que se provoque el evento Load. Después de que </a:t>
             </a:r>
             <a:r>
               <a:rPr lang="es-AR" sz="2000" b="1" dirty="0" smtClean="0"/>
@@ -15317,11 +15228,7 @@
             </a:r>
             <a:r>
               <a:rPr lang="es-AR" sz="2000" dirty="0" smtClean="0"/>
-              <a:t> </a:t>
-            </a:r>
-            <a:r>
-              <a:rPr lang="es-AR" sz="2000" dirty="0" smtClean="0"/>
-              <a:t>llama al método del evento </a:t>
+              <a:t> llama al método del evento </a:t>
             </a:r>
             <a:r>
               <a:rPr lang="es-AR" sz="2000" dirty="0" err="1" smtClean="0"/>
@@ -15400,18 +15307,7 @@
                   </a:schemeClr>
                 </a:solidFill>
               </a:rPr>
-              <a:t>Eventos de </a:t>
-            </a:r>
-            <a:r>
-              <a:rPr lang="es-AR" sz="2000" b="1" dirty="0" smtClean="0">
-                <a:solidFill>
-                  <a:schemeClr val="tx2">
-                    <a:lumMod val="40000"/>
-                    <a:lumOff val="60000"/>
-                  </a:schemeClr>
-                </a:solidFill>
-              </a:rPr>
-              <a:t>control</a:t>
+              <a:t>Eventos de control</a:t>
             </a:r>
             <a:r>
               <a:rPr lang="es-AR" sz="2000" b="1" dirty="0">
@@ -15446,11 +15342,7 @@
             </a:pPr>
             <a:r>
               <a:rPr lang="es-AR" sz="2000" dirty="0" smtClean="0"/>
-              <a:t>utilice </a:t>
-            </a:r>
-            <a:r>
-              <a:rPr lang="es-AR" sz="2000" dirty="0" smtClean="0"/>
-              <a:t>estos eventos para controlar eventos de control específicos, como un evento </a:t>
+              <a:t>utilice estos eventos para controlar eventos de control específicos, como un evento </a:t>
             </a:r>
             <a:r>
               <a:rPr lang="es-AR" sz="2000" dirty="0" err="1" smtClean="0"/>
@@ -15603,7 +15495,7 @@
           <a:p>
             <a:fld id="{53D273FE-D134-4E93-BF5F-16226B1DA42C}" type="datetime1">
               <a:rPr lang="es-ES" smtClean="0"/>
-              <a:t>15/05/2014</a:t>
+              <a:t>29/04/2015</a:t>
             </a:fld>
             <a:endParaRPr lang="es-AR"/>
           </a:p>
@@ -15681,11 +15573,7 @@
           <a:p>
             <a:r>
               <a:rPr lang="es-AR" sz="2000" dirty="0" smtClean="0"/>
-              <a:t>utilice </a:t>
-            </a:r>
-            <a:r>
-              <a:rPr lang="es-AR" sz="2000" dirty="0" smtClean="0"/>
-              <a:t>este evento para las tareas que requieran que se carguen todos los demás controles en la página.</a:t>
+              <a:t>utilice este evento para las tareas que requieran que se carguen todos los demás controles en la página.</a:t>
             </a:r>
           </a:p>
           <a:p>
@@ -15729,11 +15617,7 @@
           <a:p>
             <a:r>
               <a:rPr lang="es-AR" sz="2000" dirty="0" smtClean="0"/>
-              <a:t>antes </a:t>
-            </a:r>
-            <a:r>
-              <a:rPr lang="es-AR" sz="2000" dirty="0" smtClean="0"/>
-              <a:t>de que se produzca este evento:</a:t>
+              <a:t>antes de que se produzca este evento:</a:t>
             </a:r>
           </a:p>
           <a:p>
@@ -15864,11 +15748,7 @@
             </a:pPr>
             <a:r>
               <a:rPr lang="es-AR" sz="2000" dirty="0" smtClean="0"/>
-              <a:t>antes </a:t>
-            </a:r>
-            <a:r>
-              <a:rPr lang="es-AR" sz="2000" dirty="0" smtClean="0"/>
-              <a:t>de que se produzca este evento, </a:t>
+              <a:t>antes de que se produzca este evento, </a:t>
             </a:r>
             <a:r>
               <a:rPr lang="es-AR" sz="2000" dirty="0" err="1" smtClean="0"/>
@@ -16054,7 +15934,7 @@
           <a:p>
             <a:fld id="{C0E4326B-C117-4C5C-AD90-AF8D2274732A}" type="datetime1">
               <a:rPr lang="es-ES" smtClean="0"/>
-              <a:t>15/05/2014</a:t>
+              <a:t>29/04/2015</a:t>
             </a:fld>
             <a:endParaRPr lang="es-AR"/>
           </a:p>
@@ -16140,11 +16020,7 @@
           <a:p>
             <a:r>
               <a:rPr lang="es-AR" sz="2000" dirty="0" smtClean="0"/>
-              <a:t>éste </a:t>
-            </a:r>
-            <a:r>
-              <a:rPr lang="es-AR" sz="2000" dirty="0" smtClean="0"/>
-              <a:t>no es un evento; en esta fase del procesamiento, el objeto </a:t>
+              <a:t>éste no es un evento; en esta fase del procesamiento, el objeto </a:t>
             </a:r>
             <a:r>
               <a:rPr lang="es-AR" sz="2000" b="1" dirty="0" smtClean="0"/>
@@ -16244,11 +16120,7 @@
             </a:pPr>
             <a:r>
               <a:rPr lang="es-AR" sz="2000" dirty="0" smtClean="0"/>
-              <a:t>Este </a:t>
-            </a:r>
-            <a:r>
-              <a:rPr lang="es-AR" sz="2000" dirty="0" smtClean="0"/>
-              <a:t>evento se produce para cada control y después para la página. En los controles, utilice este evento para realizar tareas finales de limpieza en controles específicos, como cerrar las conexiones a bases de datos específicas del control.</a:t>
+              <a:t>Este evento se produce para cada control y después para la página. En los controles, utilice este evento para realizar tareas finales de limpieza en controles específicos, como cerrar las conexiones a bases de datos específicas del control.</a:t>
             </a:r>
           </a:p>
           <a:p>
@@ -16373,7 +16245,7 @@
           <a:p>
             <a:fld id="{B4F23505-AF12-4858-AA34-AEC0A383D7F0}" type="datetime1">
               <a:rPr lang="es-ES" smtClean="0"/>
-              <a:t>15/05/2014</a:t>
+              <a:t>29/04/2015</a:t>
             </a:fld>
             <a:endParaRPr lang="es-AR"/>
           </a:p>
@@ -16617,7 +16489,7 @@
           <a:p>
             <a:fld id="{B8F08934-5BBE-4035-BC95-F67AD28CA9F8}" type="datetime1">
               <a:rPr lang="es-ES" smtClean="0"/>
-              <a:t>15/05/2014</a:t>
+              <a:t>29/04/2015</a:t>
             </a:fld>
             <a:endParaRPr lang="es-AR"/>
           </a:p>
@@ -16803,7 +16675,7 @@
           <a:p>
             <a:fld id="{7E8AA17E-8997-4CDF-8DBC-A0DF03A019BC}" type="datetime1">
               <a:rPr lang="es-ES" smtClean="0"/>
-              <a:t>15/05/2014</a:t>
+              <a:t>29/04/2015</a:t>
             </a:fld>
             <a:endParaRPr lang="es-ES"/>
           </a:p>
@@ -17030,7 +16902,7 @@
           <a:p>
             <a:fld id="{A9C872D4-BF24-4B16-8065-6792818A0CD6}" type="datetime1">
               <a:rPr lang="es-ES" smtClean="0"/>
-              <a:t>15/05/2014</a:t>
+              <a:t>29/04/2015</a:t>
             </a:fld>
             <a:endParaRPr lang="es-AR"/>
           </a:p>
@@ -17270,7 +17142,7 @@
           <a:p>
             <a:fld id="{E3C407B1-EE78-4036-822F-CF2CF4EB649A}" type="datetime1">
               <a:rPr lang="es-ES" smtClean="0"/>
-              <a:t>15/05/2014</a:t>
+              <a:t>29/04/2015</a:t>
             </a:fld>
             <a:endParaRPr lang="es-AR"/>
           </a:p>
@@ -17479,7 +17351,7 @@
           <a:p>
             <a:fld id="{B141FBF7-079D-4582-B028-524C83B938BF}" type="datetime1">
               <a:rPr lang="es-ES" smtClean="0"/>
-              <a:t>15/05/2014</a:t>
+              <a:t>29/04/2015</a:t>
             </a:fld>
             <a:endParaRPr lang="es-AR"/>
           </a:p>
@@ -17684,7 +17556,7 @@
           <a:p>
             <a:fld id="{7A723A6F-2112-401F-8BFC-F4A10B4D38F2}" type="datetime1">
               <a:rPr lang="es-ES" smtClean="0"/>
-              <a:t>15/05/2014</a:t>
+              <a:t>29/04/2015</a:t>
             </a:fld>
             <a:endParaRPr lang="es-AR"/>
           </a:p>
@@ -17911,7 +17783,7 @@
           <a:p>
             <a:fld id="{ECC9E511-51AA-43A0-B024-8E908D8B4BD8}" type="datetime1">
               <a:rPr lang="es-ES" smtClean="0"/>
-              <a:t>15/05/2014</a:t>
+              <a:t>29/04/2015</a:t>
             </a:fld>
             <a:endParaRPr lang="es-AR"/>
           </a:p>
@@ -18151,7 +18023,7 @@
           <a:p>
             <a:fld id="{1B0EF7BA-13C1-4A6E-8A38-48E55D2A72D2}" type="datetime1">
               <a:rPr lang="es-ES" smtClean="0"/>
-              <a:t>15/05/2014</a:t>
+              <a:t>29/04/2015</a:t>
             </a:fld>
             <a:endParaRPr lang="es-AR"/>
           </a:p>
@@ -18352,7 +18224,7 @@
           <a:p>
             <a:fld id="{5E24136B-E554-4E27-A13C-CA481005F6AD}" type="datetime1">
               <a:rPr lang="es-ES" smtClean="0"/>
-              <a:t>15/05/2014</a:t>
+              <a:t>29/04/2015</a:t>
             </a:fld>
             <a:endParaRPr lang="es-AR"/>
           </a:p>
@@ -18515,7 +18387,7 @@
           <a:p>
             <a:fld id="{7E868D44-256D-48C6-B2D2-A13577931A7D}" type="datetime1">
               <a:rPr lang="es-ES" smtClean="0"/>
-              <a:t>15/05/2014</a:t>
+              <a:t>29/04/2015</a:t>
             </a:fld>
             <a:endParaRPr lang="es-AR"/>
           </a:p>
@@ -18759,7 +18631,7 @@
           <a:p>
             <a:fld id="{DC0AC94D-9243-43CD-B6D2-4F3C72E9B099}" type="datetime1">
               <a:rPr lang="es-ES" smtClean="0"/>
-              <a:t>15/05/2014</a:t>
+              <a:t>29/04/2015</a:t>
             </a:fld>
             <a:endParaRPr lang="es-AR"/>
           </a:p>
@@ -18995,7 +18867,7 @@
           <a:p>
             <a:fld id="{65E71D11-0831-4F5E-B325-4BBA82606EFB}" type="datetime1">
               <a:rPr lang="es-ES" smtClean="0"/>
-              <a:t>15/05/2014</a:t>
+              <a:t>29/04/2015</a:t>
             </a:fld>
             <a:endParaRPr lang="es-AR"/>
           </a:p>
@@ -19272,7 +19144,7 @@
           <a:p>
             <a:fld id="{A2782A7E-5911-4E78-84AF-443E5F408E42}" type="datetime1">
               <a:rPr lang="es-ES" smtClean="0"/>
-              <a:t>15/05/2014</a:t>
+              <a:t>29/04/2015</a:t>
             </a:fld>
             <a:endParaRPr lang="es-ES"/>
           </a:p>
@@ -19507,7 +19379,7 @@
           <a:p>
             <a:fld id="{32817AD2-1C76-4858-8132-1EDD15F65FE8}" type="datetime1">
               <a:rPr lang="es-ES" smtClean="0"/>
-              <a:t>15/05/2014</a:t>
+              <a:t>29/04/2015</a:t>
             </a:fld>
             <a:endParaRPr lang="es-AR"/>
           </a:p>
@@ -19970,7 +19842,7 @@
           <a:p>
             <a:fld id="{56179BE2-E675-4265-AB58-135971F3D4F9}" type="datetime1">
               <a:rPr lang="es-ES" smtClean="0"/>
-              <a:t>15/05/2014</a:t>
+              <a:t>29/04/2015</a:t>
             </a:fld>
             <a:endParaRPr lang="es-AR"/>
           </a:p>
@@ -20157,7 +20029,7 @@
           <a:p>
             <a:fld id="{509C9BDA-DFEF-4860-8685-F054A10C0586}" type="datetime1">
               <a:rPr lang="es-ES" smtClean="0"/>
-              <a:t>15/05/2014</a:t>
+              <a:t>29/04/2015</a:t>
             </a:fld>
             <a:endParaRPr lang="es-ES"/>
           </a:p>
@@ -20733,7 +20605,7 @@
           <a:p>
             <a:fld id="{FE42A049-1D7F-4737-9C52-8090C6FCDEA7}" type="datetime1">
               <a:rPr lang="es-ES" smtClean="0"/>
-              <a:t>15/05/2014</a:t>
+              <a:t>29/04/2015</a:t>
             </a:fld>
             <a:endParaRPr lang="es-ES"/>
           </a:p>
@@ -20905,7 +20777,7 @@
           <a:p>
             <a:fld id="{C7226448-9EBD-4167-BE7C-D80D6D339260}" type="datetime1">
               <a:rPr lang="es-ES" smtClean="0"/>
-              <a:t>15/05/2014</a:t>
+              <a:t>29/04/2015</a:t>
             </a:fld>
             <a:endParaRPr lang="es-AR"/>
           </a:p>
@@ -21098,7 +20970,7 @@
           <a:p>
             <a:fld id="{162E8847-88E6-48A0-82CA-8719A0E4CB3C}" type="datetime1">
               <a:rPr lang="es-ES" smtClean="0"/>
-              <a:t>15/05/2014</a:t>
+              <a:t>29/04/2015</a:t>
             </a:fld>
             <a:endParaRPr lang="es-AR"/>
           </a:p>
@@ -21159,8 +21031,8 @@
           </a:prstGeom>
           <a:noFill/>
           <a:extLst>
-            <a:ext uri="{909E8E84-426E-40dd-AFC4-6F175D3DCCD1}">
-              <a14:hiddenFill xmlns:a14="http://schemas.microsoft.com/office/drawing/2010/main" xmlns="">
+            <a:ext uri="{909E8E84-426E-40DD-AFC4-6F175D3DCCD1}">
+              <a14:hiddenFill xmlns:a14="http://schemas.microsoft.com/office/drawing/2010/main">
                 <a:solidFill>
                   <a:srgbClr val="FFFFFF"/>
                 </a:solidFill>
@@ -21332,7 +21204,7 @@
           <a:p>
             <a:fld id="{4D51A814-74EE-4D7A-B91E-B7E7C77E2DBA}" type="datetime1">
               <a:rPr lang="es-ES" smtClean="0"/>
-              <a:t>15/05/2014</a:t>
+              <a:t>29/04/2015</a:t>
             </a:fld>
             <a:endParaRPr lang="es-ES"/>
           </a:p>

</xml_diff>